<commit_message>
added Dashboard images in the repo
</commit_message>
<xml_diff>
--- a/Bank Loan Problem statement.pptx
+++ b/Bank Loan Problem statement.pptx
@@ -2917,11 +2917,10 @@
   <p:cSld>
     <p:bg>
       <p:bgPr>
-        <a:solidFill>
-          <a:schemeClr val="accent2">
-            <a:lumMod val="50000"/>
-          </a:schemeClr>
-        </a:solidFill>
+        <a:blipFill rotWithShape="1">
+          <a:blip r:embed="rId1"/>
+          <a:tile tx="0" ty="0" sx="100000" sy="100000" flip="none" algn="tl"/>
+        </a:blipFill>
         <a:effectLst/>
       </p:bgPr>
     </p:bg>
@@ -3037,12 +3036,12 @@
           <p:nvPr/>
         </p:nvPicPr>
         <p:blipFill>
-          <a:blip r:embed="rId1">
+          <a:blip r:embed="rId2">
             <a:lum bright="70000" contrast="-70000"/>
             <a:extLst>
               <a:ext uri="{BEBA8EAE-BF5A-486C-A8C5-ECC9F3942E4B}">
                 <a14:imgProps xmlns:a14="http://schemas.microsoft.com/office/drawing/2010/main">
-                  <a14:imgLayer r:embed="rId2">
+                  <a14:imgLayer r:embed="rId3">
                     <a14:imgEffect>
                       <a14:colorTemperature colorTemp="4700"/>
                     </a14:imgEffect>
@@ -3061,7 +3060,7 @@
         </p:blipFill>
         <p:spPr bwMode="auto">
           <a:xfrm>
-            <a:off x="1867409" y="2494495"/>
+            <a:off x="1867409" y="2189695"/>
             <a:ext cx="2513849" cy="3015392"/>
           </a:xfrm>
           <a:prstGeom prst="rect">
@@ -3088,7 +3087,7 @@
           <p:nvPr/>
         </p:nvPicPr>
         <p:blipFill rotWithShape="1">
-          <a:blip r:embed="rId3">
+          <a:blip r:embed="rId4">
             <a:duotone>
               <a:schemeClr val="accent2">
                 <a:shade val="45000"/>
@@ -3109,7 +3108,7 @@
         </p:blipFill>
         <p:spPr bwMode="auto">
           <a:xfrm>
-            <a:off x="4675950" y="2246966"/>
+            <a:off x="4675950" y="1770716"/>
             <a:ext cx="1631368" cy="3510451"/>
           </a:xfrm>
           <a:prstGeom prst="rect">
@@ -3136,7 +3135,7 @@
           <p:nvPr/>
         </p:nvPicPr>
         <p:blipFill rotWithShape="1">
-          <a:blip r:embed="rId3">
+          <a:blip r:embed="rId4">
             <a:duotone>
               <a:schemeClr val="accent4">
                 <a:shade val="45000"/>
@@ -3157,7 +3156,7 @@
         </p:blipFill>
         <p:spPr bwMode="auto">
           <a:xfrm>
-            <a:off x="5961956" y="2246966"/>
+            <a:off x="5961956" y="1780241"/>
             <a:ext cx="1327880" cy="3510451"/>
           </a:xfrm>
           <a:prstGeom prst="rect">
@@ -3184,7 +3183,7 @@
           <p:nvPr/>
         </p:nvPicPr>
         <p:blipFill>
-          <a:blip r:embed="rId4">
+          <a:blip r:embed="rId5">
             <a:extLst>
               <a:ext uri="{28A0092B-C50C-407E-A947-70E740481C1C}">
                 <a14:useLocalDpi xmlns:a14="http://schemas.microsoft.com/office/drawing/2010/main" val="0"/>
@@ -3197,7 +3196,7 @@
         </p:blipFill>
         <p:spPr>
           <a:xfrm>
-            <a:off x="6954866" y="2863504"/>
+            <a:off x="6954866" y="2568229"/>
             <a:ext cx="4095498" cy="2303718"/>
           </a:xfrm>
           <a:prstGeom prst="rect">
@@ -3268,7 +3267,7 @@
             <p:nvPr/>
           </p:nvPicPr>
           <p:blipFill>
-            <a:blip r:embed="rId4">
+            <a:blip r:embed="rId5">
               <a:extLst>
                 <a:ext uri="{28A0092B-C50C-407E-A947-70E740481C1C}">
                   <a14:useLocalDpi xmlns:a14="http://schemas.microsoft.com/office/drawing/2010/main" val="0"/>
@@ -3290,6 +3289,100 @@
           </p:spPr>
         </p:pic>
       </p:grpSp>
+      <p:sp>
+        <p:nvSpPr>
+          <p:cNvPr id="11" name="Rectangles 10"/>
+          <p:cNvSpPr/>
+          <p:nvPr/>
+        </p:nvSpPr>
+        <p:spPr>
+          <a:xfrm>
+            <a:off x="2389505" y="5287010"/>
+            <a:ext cx="7412990" cy="1198880"/>
+          </a:xfrm>
+          <a:prstGeom prst="rect">
+            <a:avLst/>
+          </a:prstGeom>
+          <a:noFill/>
+          <a:ln>
+            <a:noFill/>
+          </a:ln>
+        </p:spPr>
+        <p:txBody>
+          <a:bodyPr wrap="none" rtlCol="0" anchor="t">
+            <a:spAutoFit/>
+            <a:scene3d>
+              <a:camera prst="orthographicFront"/>
+              <a:lightRig rig="threePt" dir="t"/>
+            </a:scene3d>
+            <a:sp3d prstMaterial="softEdge"/>
+          </a:bodyPr>
+          <a:p>
+            <a:pPr algn="ctr"/>
+            <a:r>
+              <a:rPr lang="en-US" altLang="zh-CN" sz="7200" b="1">
+                <a:ln w="12700" cmpd="sng">
+                  <a:solidFill>
+                    <a:schemeClr val="accent4"/>
+                  </a:solidFill>
+                  <a:prstDash val="solid"/>
+                </a:ln>
+                <a:gradFill>
+                  <a:gsLst>
+                    <a:gs pos="0">
+                      <a:schemeClr val="accent4"/>
+                    </a:gs>
+                    <a:gs pos="4000">
+                      <a:schemeClr val="accent4">
+                        <a:lumMod val="60000"/>
+                        <a:lumOff val="40000"/>
+                      </a:schemeClr>
+                    </a:gs>
+                    <a:gs pos="87000">
+                      <a:schemeClr val="accent4">
+                        <a:lumMod val="20000"/>
+                        <a:lumOff val="80000"/>
+                      </a:schemeClr>
+                    </a:gs>
+                  </a:gsLst>
+                  <a:lin ang="5400000"/>
+                </a:gradFill>
+                <a:effectLst/>
+              </a:rPr>
+              <a:t>Bank Loan Analysis</a:t>
+            </a:r>
+            <a:endParaRPr lang="en-US" altLang="zh-CN" sz="7200" b="1">
+              <a:ln w="12700" cmpd="sng">
+                <a:solidFill>
+                  <a:schemeClr val="accent4"/>
+                </a:solidFill>
+                <a:prstDash val="solid"/>
+              </a:ln>
+              <a:gradFill>
+                <a:gsLst>
+                  <a:gs pos="0">
+                    <a:schemeClr val="accent4"/>
+                  </a:gs>
+                  <a:gs pos="4000">
+                    <a:schemeClr val="accent4">
+                      <a:lumMod val="60000"/>
+                      <a:lumOff val="40000"/>
+                    </a:schemeClr>
+                  </a:gs>
+                  <a:gs pos="87000">
+                    <a:schemeClr val="accent4">
+                      <a:lumMod val="20000"/>
+                      <a:lumOff val="80000"/>
+                    </a:schemeClr>
+                  </a:gs>
+                </a:gsLst>
+                <a:lin ang="5400000"/>
+              </a:gradFill>
+              <a:effectLst/>
+            </a:endParaRPr>
+          </a:p>
+        </p:txBody>
+      </p:sp>
     </p:spTree>
   </p:cSld>
   <p:clrMapOvr>

</xml_diff>